<commit_message>
RC 2 release (See review history)
</commit_message>
<xml_diff>
--- a/OPEN SOURCE AUDITS IN MERGER AND ACQUISITION TRANSACTIONS/RC/Figures_M&A_paper_JP.pptx
+++ b/OPEN SOURCE AUDITS IN MERGER AND ACQUISITION TRANSACTIONS/RC/Figures_M&A_paper_JP.pptx
@@ -125,7 +125,7 @@
   </p:defaultTextStyle>
   <p:extLst>
     <p:ext uri="{EFAFB233-063F-42B5-8137-9DF3F51BA10A}">
-      <p15:sldGuideLst xmlns:p15="http://schemas.microsoft.com/office/powerpoint/2012/main" xmlns="">
+      <p15:sldGuideLst xmlns="" xmlns:p15="http://schemas.microsoft.com/office/powerpoint/2012/main">
         <p15:guide id="1" orient="horz" pos="2296" userDrawn="1">
           <p15:clr>
             <a:srgbClr val="A4A3A4"/>
@@ -139,7 +139,7 @@
       </p15:sldGuideLst>
     </p:ext>
     <p:ext uri="{2D200454-40CA-4A62-9FC3-DE9A4176ACB9}">
-      <p15:notesGuideLst xmlns:p15="http://schemas.microsoft.com/office/powerpoint/2012/main" xmlns=""/>
+      <p15:notesGuideLst xmlns="" xmlns:p15="http://schemas.microsoft.com/office/powerpoint/2012/main"/>
     </p:ext>
   </p:extLst>
 </p:presentation>
@@ -227,7 +227,7 @@
           <a:p>
             <a:fld id="{E6FDABA1-4B5D-4D1A-B9E0-E772E7058171}" type="datetimeFigureOut">
               <a:rPr lang="sv-SE" smtClean="0"/>
-              <a:t>2017-11-23</a:t>
+              <a:t>2018-01-13</a:t>
             </a:fld>
             <a:endParaRPr lang="sv-SE"/>
           </a:p>
@@ -392,7 +392,7 @@
           <a:p>
             <a:fld id="{DE46D2F7-F797-442B-A22D-84CBF0D5BA4F}" type="datetimeFigureOut">
               <a:rPr lang="sv-SE" smtClean="0"/>
-              <a:t>2017-11-23</a:t>
+              <a:t>2018-01-13</a:t>
             </a:fld>
             <a:endParaRPr lang="sv-SE"/>
           </a:p>
@@ -2104,7 +2104,7 @@
           <a:p>
             <a:fld id="{644446D9-CA4E-47F7-ADA0-1C514647DC66}" type="datetimeFigureOut">
               <a:rPr lang="en-US" smtClean="0"/>
-              <a:t>11/23/2017</a:t>
+              <a:t>1/13/2018</a:t>
             </a:fld>
             <a:endParaRPr lang="en-US"/>
           </a:p>
@@ -2274,7 +2274,7 @@
           <a:p>
             <a:fld id="{644446D9-CA4E-47F7-ADA0-1C514647DC66}" type="datetimeFigureOut">
               <a:rPr lang="en-US" smtClean="0"/>
-              <a:t>11/23/2017</a:t>
+              <a:t>1/13/2018</a:t>
             </a:fld>
             <a:endParaRPr lang="en-US"/>
           </a:p>
@@ -2454,7 +2454,7 @@
           <a:p>
             <a:fld id="{644446D9-CA4E-47F7-ADA0-1C514647DC66}" type="datetimeFigureOut">
               <a:rPr lang="en-US" smtClean="0"/>
-              <a:t>11/23/2017</a:t>
+              <a:t>1/13/2018</a:t>
             </a:fld>
             <a:endParaRPr lang="en-US"/>
           </a:p>
@@ -2624,7 +2624,7 @@
           <a:p>
             <a:fld id="{644446D9-CA4E-47F7-ADA0-1C514647DC66}" type="datetimeFigureOut">
               <a:rPr lang="en-US" smtClean="0"/>
-              <a:t>11/23/2017</a:t>
+              <a:t>1/13/2018</a:t>
             </a:fld>
             <a:endParaRPr lang="en-US"/>
           </a:p>
@@ -2870,7 +2870,7 @@
           <a:p>
             <a:fld id="{644446D9-CA4E-47F7-ADA0-1C514647DC66}" type="datetimeFigureOut">
               <a:rPr lang="en-US" smtClean="0"/>
-              <a:t>11/23/2017</a:t>
+              <a:t>1/13/2018</a:t>
             </a:fld>
             <a:endParaRPr lang="en-US"/>
           </a:p>
@@ -3102,7 +3102,7 @@
           <a:p>
             <a:fld id="{644446D9-CA4E-47F7-ADA0-1C514647DC66}" type="datetimeFigureOut">
               <a:rPr lang="en-US" smtClean="0"/>
-              <a:t>11/23/2017</a:t>
+              <a:t>1/13/2018</a:t>
             </a:fld>
             <a:endParaRPr lang="en-US"/>
           </a:p>
@@ -3469,7 +3469,7 @@
           <a:p>
             <a:fld id="{644446D9-CA4E-47F7-ADA0-1C514647DC66}" type="datetimeFigureOut">
               <a:rPr lang="en-US" smtClean="0"/>
-              <a:t>11/23/2017</a:t>
+              <a:t>1/13/2018</a:t>
             </a:fld>
             <a:endParaRPr lang="en-US"/>
           </a:p>
@@ -3587,7 +3587,7 @@
           <a:p>
             <a:fld id="{644446D9-CA4E-47F7-ADA0-1C514647DC66}" type="datetimeFigureOut">
               <a:rPr lang="en-US" smtClean="0"/>
-              <a:t>11/23/2017</a:t>
+              <a:t>1/13/2018</a:t>
             </a:fld>
             <a:endParaRPr lang="en-US"/>
           </a:p>
@@ -3682,7 +3682,7 @@
           <a:p>
             <a:fld id="{644446D9-CA4E-47F7-ADA0-1C514647DC66}" type="datetimeFigureOut">
               <a:rPr lang="en-US" smtClean="0"/>
-              <a:t>11/23/2017</a:t>
+              <a:t>1/13/2018</a:t>
             </a:fld>
             <a:endParaRPr lang="en-US"/>
           </a:p>
@@ -3959,7 +3959,7 @@
           <a:p>
             <a:fld id="{644446D9-CA4E-47F7-ADA0-1C514647DC66}" type="datetimeFigureOut">
               <a:rPr lang="en-US" smtClean="0"/>
-              <a:t>11/23/2017</a:t>
+              <a:t>1/13/2018</a:t>
             </a:fld>
             <a:endParaRPr lang="en-US"/>
           </a:p>
@@ -4212,7 +4212,7 @@
           <a:p>
             <a:fld id="{644446D9-CA4E-47F7-ADA0-1C514647DC66}" type="datetimeFigureOut">
               <a:rPr lang="en-US" smtClean="0"/>
-              <a:t>11/23/2017</a:t>
+              <a:t>1/13/2018</a:t>
             </a:fld>
             <a:endParaRPr lang="en-US"/>
           </a:p>
@@ -4425,7 +4425,7 @@
           <a:p>
             <a:fld id="{644446D9-CA4E-47F7-ADA0-1C514647DC66}" type="datetimeFigureOut">
               <a:rPr lang="en-US" smtClean="0"/>
-              <a:t>11/23/2017</a:t>
+              <a:t>1/13/2018</a:t>
             </a:fld>
             <a:endParaRPr lang="en-US"/>
           </a:p>
@@ -5007,8 +5007,8 @@
         </p:nvSpPr>
         <p:spPr>
           <a:xfrm>
-            <a:off x="8346563" y="1148862"/>
-            <a:ext cx="588397" cy="633889"/>
+            <a:off x="8365426" y="1148862"/>
+            <a:ext cx="576000" cy="612000"/>
           </a:xfrm>
           <a:prstGeom prst="arc">
             <a:avLst/>
@@ -5055,7 +5055,7 @@
         <p:spPr>
           <a:xfrm flipH="1">
             <a:off x="2760184" y="1148862"/>
-            <a:ext cx="5880577" cy="3714"/>
+            <a:ext cx="5893242" cy="3714"/>
           </a:xfrm>
           <a:prstGeom prst="line">
             <a:avLst/>
@@ -5206,9 +5206,9 @@
           <p:nvPr/>
         </p:nvSpPr>
         <p:spPr>
-          <a:xfrm rot="16452913">
-            <a:off x="2473475" y="3193454"/>
-            <a:ext cx="588397" cy="633889"/>
+          <a:xfrm rot="16200000">
+            <a:off x="2466374" y="3217206"/>
+            <a:ext cx="612000" cy="612000"/>
           </a:xfrm>
           <a:prstGeom prst="arc">
             <a:avLst/>
@@ -5917,7 +5917,7 @@
                 <a14:useLocalDpi xmlns:a14="http://schemas.microsoft.com/office/drawing/2010/main" val="0"/>
               </a:ext>
               <a:ext uri="{96DAC541-7B7A-43D3-8B79-37D633B846F1}">
-                <asvg:svgBlip xmlns:asvg="http://schemas.microsoft.com/office/drawing/2016/SVG/main" xmlns="" r:embed="rId25"/>
+                <asvg:svgBlip xmlns="" xmlns:asvg="http://schemas.microsoft.com/office/drawing/2016/SVG/main" r:embed="rId25"/>
               </a:ext>
             </a:extLst>
           </a:blip>
@@ -6127,7 +6127,39 @@
                 <a:ea typeface="メイリオ" panose="020B0604030504040204" pitchFamily="50" charset="-128"/>
                 <a:cs typeface="メイリオ" panose="020B0604030504040204" pitchFamily="50" charset="-128"/>
               </a:rPr>
-              <a:t>プロジェクトをキックオフし、すべての関係組織の窓口担当を紹介し換算に関する詳細情報を伝えます。</a:t>
+              <a:t>プロジェクトをキックオフし、すべての関係組織の窓口担当を紹</a:t>
+            </a:r>
+            <a:r>
+              <a:rPr lang="ja-JP" altLang="en-US" sz="1100" dirty="0" smtClean="0">
+                <a:latin typeface="メイリオ" panose="020B0604030504040204" pitchFamily="50" charset="-128"/>
+                <a:ea typeface="メイリオ" panose="020B0604030504040204" pitchFamily="50" charset="-128"/>
+                <a:cs typeface="メイリオ" panose="020B0604030504040204" pitchFamily="50" charset="-128"/>
+              </a:rPr>
+              <a:t>介し</a:t>
+            </a:r>
+            <a:r>
+              <a:rPr lang="ja-JP" altLang="en-US" sz="1100" dirty="0">
+                <a:latin typeface="メイリオ" panose="020B0604030504040204" pitchFamily="50" charset="-128"/>
+                <a:ea typeface="メイリオ" panose="020B0604030504040204" pitchFamily="50" charset="-128"/>
+                <a:cs typeface="メイリオ" panose="020B0604030504040204" pitchFamily="50" charset="-128"/>
+              </a:rPr>
+              <a:t>監査</a:t>
+            </a:r>
+            <a:r>
+              <a:rPr lang="ja-JP" altLang="en-US" sz="1100" dirty="0" smtClean="0">
+                <a:latin typeface="メイリオ" panose="020B0604030504040204" pitchFamily="50" charset="-128"/>
+                <a:ea typeface="メイリオ" panose="020B0604030504040204" pitchFamily="50" charset="-128"/>
+                <a:cs typeface="メイリオ" panose="020B0604030504040204" pitchFamily="50" charset="-128"/>
+              </a:rPr>
+              <a:t>に</a:t>
+            </a:r>
+            <a:r>
+              <a:rPr lang="ja-JP" altLang="en-US" sz="1100" dirty="0" smtClean="0">
+                <a:latin typeface="メイリオ" panose="020B0604030504040204" pitchFamily="50" charset="-128"/>
+                <a:ea typeface="メイリオ" panose="020B0604030504040204" pitchFamily="50" charset="-128"/>
+                <a:cs typeface="メイリオ" panose="020B0604030504040204" pitchFamily="50" charset="-128"/>
+              </a:rPr>
+              <a:t>関する詳細情報を伝えます。</a:t>
             </a:r>
             <a:endParaRPr lang="sv-SE" sz="1100" dirty="0">
               <a:latin typeface="メイリオ" panose="020B0604030504040204" pitchFamily="50" charset="-128"/>
@@ -6173,36 +6205,6 @@
               <a:ea typeface="メイリオ" panose="020B0604030504040204" pitchFamily="50" charset="-128"/>
               <a:cs typeface="メイリオ" panose="020B0604030504040204" pitchFamily="50" charset="-128"/>
             </a:endParaRPr>
-          </a:p>
-        </p:txBody>
-      </p:sp>
-      <p:sp>
-        <p:nvSpPr>
-          <p:cNvPr id="45" name="テキスト ボックス 44"/>
-          <p:cNvSpPr txBox="1"/>
-          <p:nvPr/>
-        </p:nvSpPr>
-        <p:spPr>
-          <a:xfrm>
-            <a:off x="152400" y="499987"/>
-            <a:ext cx="569387" cy="369332"/>
-          </a:xfrm>
-          <a:prstGeom prst="rect">
-            <a:avLst/>
-          </a:prstGeom>
-          <a:noFill/>
-        </p:spPr>
-        <p:txBody>
-          <a:bodyPr wrap="none" rtlCol="0">
-            <a:spAutoFit/>
-          </a:bodyPr>
-          <a:lstStyle/>
-          <a:p>
-            <a:r>
-              <a:rPr kumimoji="1" lang="en-US" altLang="ja-JP" dirty="0" smtClean="0"/>
-              <a:t>Fig6</a:t>
-            </a:r>
-            <a:endParaRPr kumimoji="1" lang="ja-JP" altLang="en-US" dirty="0"/>
           </a:p>
         </p:txBody>
       </p:sp>
@@ -6339,7 +6341,31 @@
           <a:p>
             <a:r>
               <a:rPr lang="ja-JP" altLang="en-US" dirty="0"/>
-              <a:t>対象企業とのレビュー後、最終的なレポートが将来の買収企業へレポートが、部品表（</a:t>
+              <a:t>対象企業とのレビュー後</a:t>
+            </a:r>
+            <a:r>
+              <a:rPr lang="ja-JP" altLang="en-US" dirty="0" smtClean="0"/>
+              <a:t>、将来</a:t>
+            </a:r>
+            <a:r>
+              <a:rPr lang="ja-JP" altLang="en-US" dirty="0"/>
+              <a:t>の買収</a:t>
+            </a:r>
+            <a:r>
+              <a:rPr lang="ja-JP" altLang="en-US" dirty="0" smtClean="0"/>
+              <a:t>企業</a:t>
+            </a:r>
+            <a:r>
+              <a:rPr lang="ja-JP" altLang="en-US" dirty="0" smtClean="0"/>
+              <a:t>に対し、</a:t>
+            </a:r>
+            <a:r>
+              <a:rPr lang="ja-JP" altLang="en-US" dirty="0" smtClean="0"/>
+              <a:t>最終的なレポートが部品表</a:t>
+            </a:r>
+            <a:r>
+              <a:rPr lang="ja-JP" altLang="en-US" dirty="0"/>
+              <a:t>（</a:t>
             </a:r>
             <a:r>
               <a:rPr lang="en-US" altLang="ja-JP" dirty="0"/>
@@ -6420,8 +6446,8 @@
         </p:nvSpPr>
         <p:spPr>
           <a:xfrm rot="16200000" flipH="1">
-            <a:off x="2453711" y="4925415"/>
-            <a:ext cx="576000" cy="576000"/>
+            <a:off x="2464344" y="4889415"/>
+            <a:ext cx="612000" cy="612000"/>
           </a:xfrm>
           <a:prstGeom prst="arc">
             <a:avLst/>
@@ -6452,6 +6478,35 @@
           <a:p>
             <a:pPr algn="ctr"/>
             <a:endParaRPr lang="en-US"/>
+          </a:p>
+        </p:txBody>
+      </p:sp>
+      <p:sp>
+        <p:nvSpPr>
+          <p:cNvPr id="41" name="テキスト ボックス 40"/>
+          <p:cNvSpPr txBox="1"/>
+          <p:nvPr/>
+        </p:nvSpPr>
+        <p:spPr>
+          <a:xfrm>
+            <a:off x="152400" y="499987"/>
+            <a:ext cx="569387" cy="369332"/>
+          </a:xfrm>
+          <a:prstGeom prst="rect">
+            <a:avLst/>
+          </a:prstGeom>
+          <a:noFill/>
+        </p:spPr>
+        <p:txBody>
+          <a:bodyPr wrap="none" rtlCol="0">
+            <a:spAutoFit/>
+          </a:bodyPr>
+          <a:lstStyle/>
+          <a:p>
+            <a:r>
+              <a:rPr kumimoji="1" lang="en-US" altLang="ja-JP" dirty="0" smtClean="0"/>
+              <a:t>Fig5</a:t>
+            </a:r>
           </a:p>
         </p:txBody>
       </p:sp>
@@ -8226,7 +8281,7 @@
           <a:p>
             <a:r>
               <a:rPr kumimoji="1" lang="en-US" altLang="ja-JP" dirty="0" smtClean="0"/>
-              <a:t>Fig7</a:t>
+              <a:t>Fig6</a:t>
             </a:r>
             <a:endParaRPr kumimoji="1" lang="ja-JP" altLang="en-US" dirty="0"/>
           </a:p>
@@ -8368,7 +8423,7 @@
         </p:nvCxnSpPr>
         <p:spPr>
           <a:xfrm flipH="1" flipV="1">
-            <a:off x="3613175" y="1121136"/>
+            <a:off x="3613175" y="1106388"/>
             <a:ext cx="5475101" cy="0"/>
           </a:xfrm>
           <a:prstGeom prst="line">
@@ -8609,7 +8664,7 @@
         </p:nvCxnSpPr>
         <p:spPr>
           <a:xfrm flipH="1">
-            <a:off x="1596276" y="5271701"/>
+            <a:off x="1596276" y="5286449"/>
             <a:ext cx="7806411" cy="0"/>
           </a:xfrm>
           <a:prstGeom prst="line">
@@ -8792,7 +8847,23 @@
                 <a:ea typeface="メイリオ" panose="020B0604030504040204" pitchFamily="50" charset="-128"/>
                 <a:cs typeface="メイリオ" panose="020B0604030504040204" pitchFamily="50" charset="-128"/>
               </a:rPr>
-              <a:t>プロジェクトをキックオフし、すべての関係組織の窓口担当を紹介し換算に関する詳細情報を伝えます。</a:t>
+              <a:t>プロジェクトをキックオフし、すべての関係組織の窓口担当を紹介</a:t>
+            </a:r>
+            <a:r>
+              <a:rPr lang="ja-JP" altLang="en-US" sz="1100" dirty="0" smtClean="0">
+                <a:latin typeface="メイリオ" panose="020B0604030504040204" pitchFamily="50" charset="-128"/>
+                <a:ea typeface="メイリオ" panose="020B0604030504040204" pitchFamily="50" charset="-128"/>
+                <a:cs typeface="メイリオ" panose="020B0604030504040204" pitchFamily="50" charset="-128"/>
+              </a:rPr>
+              <a:t>し監査に</a:t>
+            </a:r>
+            <a:r>
+              <a:rPr lang="ja-JP" altLang="en-US" sz="1100" dirty="0" smtClean="0">
+                <a:latin typeface="メイリオ" panose="020B0604030504040204" pitchFamily="50" charset="-128"/>
+                <a:ea typeface="メイリオ" panose="020B0604030504040204" pitchFamily="50" charset="-128"/>
+                <a:cs typeface="メイリオ" panose="020B0604030504040204" pitchFamily="50" charset="-128"/>
+              </a:rPr>
+              <a:t>関する詳細情報を伝えます。</a:t>
             </a:r>
             <a:endParaRPr lang="sv-SE" sz="1100" dirty="0">
               <a:latin typeface="メイリオ" panose="020B0604030504040204" pitchFamily="50" charset="-128"/>
@@ -8892,7 +8963,11 @@
             </a:r>
             <a:r>
               <a:rPr lang="ja-JP" altLang="en-US" dirty="0" smtClean="0"/>
-              <a:t>に対象企業</a:t>
+              <a:t>に買収対象</a:t>
+            </a:r>
+            <a:r>
+              <a:rPr lang="ja-JP" altLang="en-US" dirty="0" smtClean="0"/>
+              <a:t>企業</a:t>
             </a:r>
             <a:r>
               <a:rPr lang="ja-JP" altLang="en-US" dirty="0"/>
@@ -9082,7 +9157,7 @@
           <a:p>
             <a:r>
               <a:rPr lang="sv-SE" dirty="0" smtClean="0"/>
-              <a:t>FOSS</a:t>
+              <a:t>FOSSID</a:t>
             </a:r>
             <a:r>
               <a:rPr lang="ja-JP" altLang="en-US" dirty="0" smtClean="0"/>
@@ -9094,7 +9169,15 @@
             </a:r>
             <a:r>
               <a:rPr lang="ja-JP" altLang="en-US" dirty="0" smtClean="0"/>
-              <a:t>社が収集した電子署名を使い彼らのオープンソースデータベースを検索し、オープンソースのファイルやスニペットとするものを探していきます。</a:t>
+              <a:t>社が収集した電子署名を使い彼らのオープンソースデータベースを検索し、オープンソースのファイルやスニペット</a:t>
+            </a:r>
+            <a:r>
+              <a:rPr lang="ja-JP" altLang="en-US" dirty="0" smtClean="0"/>
+              <a:t>と一致する</a:t>
+            </a:r>
+            <a:r>
+              <a:rPr lang="ja-JP" altLang="en-US" dirty="0" smtClean="0"/>
+              <a:t>ものを探していきます。</a:t>
             </a:r>
             <a:endParaRPr lang="sv-SE" dirty="0"/>
           </a:p>
@@ -9336,11 +9419,23 @@
             </a:r>
             <a:r>
               <a:rPr lang="ja-JP" altLang="en-US" dirty="0" smtClean="0"/>
-              <a:t>、将来の買収元と</a:t>
+              <a:t>、将来の</a:t>
+            </a:r>
+            <a:r>
+              <a:rPr lang="ja-JP" altLang="en-US" dirty="0" smtClean="0"/>
+              <a:t>買収企業と</a:t>
             </a:r>
             <a:r>
               <a:rPr lang="ja-JP" altLang="en-US" dirty="0"/>
-              <a:t>共有する前に対象企業へレビューのためのレポートが送られます。</a:t>
+              <a:t>共有する前</a:t>
+            </a:r>
+            <a:r>
+              <a:rPr lang="ja-JP" altLang="en-US" dirty="0" smtClean="0"/>
+              <a:t>に買収対象</a:t>
+            </a:r>
+            <a:r>
+              <a:rPr lang="ja-JP" altLang="en-US" dirty="0"/>
+              <a:t>企業へレビューのためのレポートが送られます。</a:t>
             </a:r>
             <a:endParaRPr lang="sv-SE" dirty="0"/>
           </a:p>
@@ -9546,7 +9641,7 @@
         <p:spPr>
           <a:xfrm>
             <a:off x="4371940" y="5536599"/>
-            <a:ext cx="2527676" cy="969496"/>
+            <a:ext cx="2527676" cy="938719"/>
           </a:xfrm>
           <a:prstGeom prst="rect">
             <a:avLst/>
@@ -9572,7 +9667,27 @@
           <a:p>
             <a:r>
               <a:rPr lang="ja-JP" altLang="en-US" dirty="0"/>
-              <a:t>対象企業とのレビュー後、最終的なレポートが将来の買収企業へレポートが、部品表（</a:t>
+              <a:t>対象企業とのレビュー後</a:t>
+            </a:r>
+            <a:r>
+              <a:rPr lang="ja-JP" altLang="en-US" dirty="0" smtClean="0"/>
+              <a:t>、将来</a:t>
+            </a:r>
+            <a:r>
+              <a:rPr lang="ja-JP" altLang="en-US" dirty="0"/>
+              <a:t>の買収企業</a:t>
+            </a:r>
+            <a:r>
+              <a:rPr lang="ja-JP" altLang="en-US" dirty="0"/>
+              <a:t>へ、最終的なレポート</a:t>
+            </a:r>
+            <a:r>
+              <a:rPr lang="ja-JP" altLang="en-US" dirty="0" smtClean="0"/>
+              <a:t>が部品表</a:t>
+            </a:r>
+            <a:r>
+              <a:rPr lang="ja-JP" altLang="en-US" dirty="0"/>
+              <a:t>（</a:t>
             </a:r>
             <a:r>
               <a:rPr lang="en-US" altLang="ja-JP" dirty="0"/>
@@ -10161,9 +10276,8 @@
           <a:p>
             <a:r>
               <a:rPr kumimoji="1" lang="en-US" altLang="ja-JP" dirty="0" smtClean="0"/>
-              <a:t>Fig7</a:t>
-            </a:r>
-            <a:endParaRPr kumimoji="1" lang="ja-JP" altLang="en-US" dirty="0"/>
+              <a:t>Fig6</a:t>
+            </a:r>
           </a:p>
         </p:txBody>
       </p:sp>
@@ -12102,6 +12216,36 @@
           </a:p>
         </p:txBody>
       </p:sp>
+      <p:sp>
+        <p:nvSpPr>
+          <p:cNvPr id="54" name="テキスト ボックス 53"/>
+          <p:cNvSpPr txBox="1"/>
+          <p:nvPr/>
+        </p:nvSpPr>
+        <p:spPr>
+          <a:xfrm>
+            <a:off x="152400" y="499987"/>
+            <a:ext cx="569387" cy="369332"/>
+          </a:xfrm>
+          <a:prstGeom prst="rect">
+            <a:avLst/>
+          </a:prstGeom>
+          <a:noFill/>
+        </p:spPr>
+        <p:txBody>
+          <a:bodyPr wrap="none" rtlCol="0">
+            <a:spAutoFit/>
+          </a:bodyPr>
+          <a:lstStyle/>
+          <a:p>
+            <a:r>
+              <a:rPr kumimoji="1" lang="en-US" altLang="ja-JP" dirty="0" smtClean="0"/>
+              <a:t>Fig7</a:t>
+            </a:r>
+            <a:endParaRPr kumimoji="1" lang="ja-JP" altLang="en-US" dirty="0"/>
+          </a:p>
+        </p:txBody>
+      </p:sp>
     </p:spTree>
     <p:extLst>
       <p:ext uri="{BB962C8B-B14F-4D97-AF65-F5344CB8AC3E}">
@@ -12410,7 +12554,7 @@
         </p:nvCxnSpPr>
         <p:spPr>
           <a:xfrm flipH="1" flipV="1">
-            <a:off x="1876077" y="5074198"/>
+            <a:off x="1876077" y="5059450"/>
             <a:ext cx="7789580" cy="0"/>
           </a:xfrm>
           <a:prstGeom prst="line">
@@ -12509,7 +12653,11 @@
           <a:p>
             <a:r>
               <a:rPr lang="ja-JP" altLang="en-US" dirty="0" smtClean="0"/>
-              <a:t>対象企業が</a:t>
+              <a:t>買収対象</a:t>
+            </a:r>
+            <a:r>
+              <a:rPr lang="ja-JP" altLang="en-US" dirty="0" smtClean="0"/>
+              <a:t>企業が</a:t>
             </a:r>
             <a:r>
               <a:rPr lang="en-US" altLang="ja-JP" dirty="0" smtClean="0"/>
@@ -12607,7 +12755,27 @@
             </a:r>
             <a:r>
               <a:rPr lang="ja-JP" altLang="en-US" dirty="0" smtClean="0"/>
-              <a:t>が対象企業向けに、ツールの操作方法（スキャン実行、レビュー結果、レポート生成）を説明する、最初のセッションを実施します。</a:t>
+              <a:t>社が買収対象</a:t>
+            </a:r>
+            <a:r>
+              <a:rPr lang="ja-JP" altLang="en-US" dirty="0" smtClean="0"/>
+              <a:t>企業向けに、ツールの操作方法（スキャン実行、レビュー結果、レポート生成）を説明</a:t>
+            </a:r>
+            <a:r>
+              <a:rPr lang="ja-JP" altLang="en-US" dirty="0" smtClean="0"/>
+              <a:t>する</a:t>
+            </a:r>
+            <a:r>
+              <a:rPr lang="ja-JP" altLang="en-US" dirty="0"/>
+              <a:t>ために</a:t>
+            </a:r>
+            <a:r>
+              <a:rPr lang="ja-JP" altLang="en-US" dirty="0" smtClean="0"/>
+              <a:t>、</a:t>
+            </a:r>
+            <a:r>
+              <a:rPr lang="ja-JP" altLang="en-US" dirty="0" smtClean="0"/>
+              <a:t>最初のセッションを実施します。</a:t>
             </a:r>
             <a:endParaRPr lang="sv-SE" dirty="0"/>
           </a:p>
@@ -12663,7 +12831,7 @@
         <p:spPr>
           <a:xfrm>
             <a:off x="7356856" y="3259834"/>
-            <a:ext cx="2118486" cy="769441"/>
+            <a:ext cx="2118486" cy="938719"/>
           </a:xfrm>
           <a:prstGeom prst="rect">
             <a:avLst/>
@@ -12696,12 +12864,12 @@
               <a:t>AB</a:t>
             </a:r>
             <a:r>
-              <a:rPr lang="ja-JP" altLang="en-US" dirty="0"/>
-              <a:t>が</a:t>
-            </a:r>
-            <a:r>
               <a:rPr lang="ja-JP" altLang="en-US" dirty="0" smtClean="0"/>
-              <a:t>対象企業に対し、期間限定で</a:t>
+              <a:t>社が買収対象</a:t>
+            </a:r>
+            <a:r>
+              <a:rPr lang="ja-JP" altLang="en-US" dirty="0" smtClean="0"/>
+              <a:t>企業に対し、期間限定で</a:t>
             </a:r>
             <a:r>
               <a:rPr lang="ja-JP" altLang="en-US" dirty="0"/>
@@ -12863,7 +13031,15 @@
           <a:p>
             <a:r>
               <a:rPr lang="ja-JP" altLang="en-US" dirty="0" smtClean="0"/>
-              <a:t>ターゲット企業がコードを監査できるようになり、すべてのファイルやスニペットについて</a:t>
+              <a:t>買収対象</a:t>
+            </a:r>
+            <a:r>
+              <a:rPr lang="ja-JP" altLang="en-US" dirty="0" smtClean="0"/>
+              <a:t>企業</a:t>
+            </a:r>
+            <a:r>
+              <a:rPr lang="ja-JP" altLang="en-US" dirty="0" smtClean="0"/>
+              <a:t>がコードを監査できるようになり、すべてのファイルやスニペットについて</a:t>
             </a:r>
             <a:r>
               <a:rPr lang="en-US" altLang="ja-JP" dirty="0" smtClean="0"/>
@@ -12871,7 +13047,27 @@
             </a:r>
             <a:r>
               <a:rPr lang="ja-JP" altLang="en-US" dirty="0" smtClean="0"/>
-              <a:t>社のオープンソース データベースとの適合を調査し、部品表（</a:t>
+              <a:t>の</a:t>
+            </a:r>
+            <a:r>
+              <a:rPr lang="ja-JP" altLang="en-US" dirty="0" smtClean="0"/>
+              <a:t>オープンソース データベース</a:t>
+            </a:r>
+            <a:r>
+              <a:rPr lang="ja-JP" altLang="en-US" dirty="0" smtClean="0"/>
+              <a:t>との</a:t>
+            </a:r>
+            <a:r>
+              <a:rPr lang="ja-JP" altLang="en-US" dirty="0"/>
+              <a:t>一致</a:t>
+            </a:r>
+            <a:r>
+              <a:rPr lang="ja-JP" altLang="en-US" dirty="0" smtClean="0"/>
+              <a:t>を</a:t>
+            </a:r>
+            <a:r>
+              <a:rPr lang="ja-JP" altLang="en-US" dirty="0" smtClean="0"/>
+              <a:t>調査し、部品表（</a:t>
             </a:r>
             <a:r>
               <a:rPr lang="en-US" altLang="ja-JP" dirty="0" smtClean="0"/>
@@ -13001,7 +13197,15 @@
             </a:r>
             <a:r>
               <a:rPr lang="ja-JP" altLang="en-US" dirty="0" smtClean="0"/>
-              <a:t>のシステムから消去されます。対象企業には</a:t>
+              <a:t>のシステムから消去されます</a:t>
+            </a:r>
+            <a:r>
+              <a:rPr lang="ja-JP" altLang="en-US" dirty="0" smtClean="0"/>
+              <a:t>。買収対象</a:t>
+            </a:r>
+            <a:r>
+              <a:rPr lang="ja-JP" altLang="en-US" dirty="0" smtClean="0"/>
+              <a:t>企業には</a:t>
             </a:r>
             <a:r>
               <a:rPr lang="ja-JP" altLang="en-US" dirty="0"/>
@@ -13979,7 +14183,39 @@
                 <a:ea typeface="メイリオ" panose="020B0604030504040204" pitchFamily="50" charset="-128"/>
                 <a:cs typeface="メイリオ" panose="020B0604030504040204" pitchFamily="50" charset="-128"/>
               </a:rPr>
-              <a:t>プロジェクトをキックオフし、すべての関係組織の窓口担当を紹介し換算に関する詳細情報を伝えます。</a:t>
+              <a:t>プロジェクトをキックオフし、すべての関係組織の窓口担当を紹</a:t>
+            </a:r>
+            <a:r>
+              <a:rPr lang="ja-JP" altLang="en-US" sz="1100" dirty="0" smtClean="0">
+                <a:latin typeface="メイリオ" panose="020B0604030504040204" pitchFamily="50" charset="-128"/>
+                <a:ea typeface="メイリオ" panose="020B0604030504040204" pitchFamily="50" charset="-128"/>
+                <a:cs typeface="メイリオ" panose="020B0604030504040204" pitchFamily="50" charset="-128"/>
+              </a:rPr>
+              <a:t>介し</a:t>
+            </a:r>
+            <a:r>
+              <a:rPr lang="ja-JP" altLang="en-US" sz="1100" dirty="0">
+                <a:latin typeface="メイリオ" panose="020B0604030504040204" pitchFamily="50" charset="-128"/>
+                <a:ea typeface="メイリオ" panose="020B0604030504040204" pitchFamily="50" charset="-128"/>
+                <a:cs typeface="メイリオ" panose="020B0604030504040204" pitchFamily="50" charset="-128"/>
+              </a:rPr>
+              <a:t>監査</a:t>
+            </a:r>
+            <a:r>
+              <a:rPr lang="ja-JP" altLang="en-US" sz="1100" dirty="0" smtClean="0">
+                <a:latin typeface="メイリオ" panose="020B0604030504040204" pitchFamily="50" charset="-128"/>
+                <a:ea typeface="メイリオ" panose="020B0604030504040204" pitchFamily="50" charset="-128"/>
+                <a:cs typeface="メイリオ" panose="020B0604030504040204" pitchFamily="50" charset="-128"/>
+              </a:rPr>
+              <a:t>に</a:t>
+            </a:r>
+            <a:r>
+              <a:rPr lang="ja-JP" altLang="en-US" sz="1100" dirty="0" smtClean="0">
+                <a:latin typeface="メイリオ" panose="020B0604030504040204" pitchFamily="50" charset="-128"/>
+                <a:ea typeface="メイリオ" panose="020B0604030504040204" pitchFamily="50" charset="-128"/>
+                <a:cs typeface="メイリオ" panose="020B0604030504040204" pitchFamily="50" charset="-128"/>
+              </a:rPr>
+              <a:t>関する詳細情報を伝えます。</a:t>
             </a:r>
             <a:endParaRPr lang="sv-SE" sz="1100" dirty="0">
               <a:latin typeface="メイリオ" panose="020B0604030504040204" pitchFamily="50" charset="-128"/>
@@ -14079,7 +14315,11 @@
             </a:r>
             <a:r>
               <a:rPr lang="ja-JP" altLang="en-US" dirty="0" smtClean="0"/>
-              <a:t>に対象企業</a:t>
+              <a:t>に買収対象</a:t>
+            </a:r>
+            <a:r>
+              <a:rPr lang="ja-JP" altLang="en-US" dirty="0" smtClean="0"/>
+              <a:t>企業</a:t>
             </a:r>
             <a:r>
               <a:rPr lang="ja-JP" altLang="en-US" dirty="0"/>
@@ -14194,6 +14434,36 @@
               <a:ea typeface="メイリオ" panose="020B0604030504040204" pitchFamily="50" charset="-128"/>
               <a:cs typeface="メイリオ" panose="020B0604030504040204" pitchFamily="50" charset="-128"/>
             </a:endParaRPr>
+          </a:p>
+        </p:txBody>
+      </p:sp>
+      <p:sp>
+        <p:nvSpPr>
+          <p:cNvPr id="71" name="テキスト ボックス 70"/>
+          <p:cNvSpPr txBox="1"/>
+          <p:nvPr/>
+        </p:nvSpPr>
+        <p:spPr>
+          <a:xfrm>
+            <a:off x="152400" y="499987"/>
+            <a:ext cx="569387" cy="369332"/>
+          </a:xfrm>
+          <a:prstGeom prst="rect">
+            <a:avLst/>
+          </a:prstGeom>
+          <a:noFill/>
+        </p:spPr>
+        <p:txBody>
+          <a:bodyPr wrap="none" rtlCol="0">
+            <a:spAutoFit/>
+          </a:bodyPr>
+          <a:lstStyle/>
+          <a:p>
+            <a:r>
+              <a:rPr kumimoji="1" lang="en-US" altLang="ja-JP" dirty="0" smtClean="0"/>
+              <a:t>Fig7</a:t>
+            </a:r>
+            <a:endParaRPr kumimoji="1" lang="ja-JP" altLang="en-US" dirty="0"/>
           </a:p>
         </p:txBody>
       </p:sp>
@@ -14564,6 +14834,35 @@
           </a:p>
         </p:txBody>
       </p:sp>
+      <p:sp>
+        <p:nvSpPr>
+          <p:cNvPr id="12" name="テキスト ボックス 11"/>
+          <p:cNvSpPr txBox="1"/>
+          <p:nvPr/>
+        </p:nvSpPr>
+        <p:spPr>
+          <a:xfrm>
+            <a:off x="167148" y="499987"/>
+            <a:ext cx="569387" cy="369332"/>
+          </a:xfrm>
+          <a:prstGeom prst="rect">
+            <a:avLst/>
+          </a:prstGeom>
+          <a:noFill/>
+        </p:spPr>
+        <p:txBody>
+          <a:bodyPr wrap="none" rtlCol="0">
+            <a:spAutoFit/>
+          </a:bodyPr>
+          <a:lstStyle/>
+          <a:p>
+            <a:r>
+              <a:rPr kumimoji="1" lang="en-US" altLang="ja-JP" dirty="0" smtClean="0"/>
+              <a:t>Fig1</a:t>
+            </a:r>
+          </a:p>
+        </p:txBody>
+      </p:sp>
     </p:spTree>
     <p:extLst>
       <p:ext uri="{BB962C8B-B14F-4D97-AF65-F5344CB8AC3E}">
@@ -14927,6 +15226,35 @@
           </a:p>
         </p:txBody>
       </p:sp>
+      <p:sp>
+        <p:nvSpPr>
+          <p:cNvPr id="12" name="テキスト ボックス 11"/>
+          <p:cNvSpPr txBox="1"/>
+          <p:nvPr/>
+        </p:nvSpPr>
+        <p:spPr>
+          <a:xfrm>
+            <a:off x="152400" y="499987"/>
+            <a:ext cx="569387" cy="369332"/>
+          </a:xfrm>
+          <a:prstGeom prst="rect">
+            <a:avLst/>
+          </a:prstGeom>
+          <a:noFill/>
+        </p:spPr>
+        <p:txBody>
+          <a:bodyPr wrap="none" rtlCol="0">
+            <a:spAutoFit/>
+          </a:bodyPr>
+          <a:lstStyle/>
+          <a:p>
+            <a:r>
+              <a:rPr kumimoji="1" lang="en-US" altLang="ja-JP" dirty="0" smtClean="0"/>
+              <a:t>Fig2</a:t>
+            </a:r>
+          </a:p>
+        </p:txBody>
+      </p:sp>
     </p:spTree>
     <p:extLst>
       <p:ext uri="{BB962C8B-B14F-4D97-AF65-F5344CB8AC3E}">
@@ -15493,6 +15821,35 @@
           </a:p>
         </p:txBody>
       </p:sp>
+      <p:sp>
+        <p:nvSpPr>
+          <p:cNvPr id="14" name="テキスト ボックス 13"/>
+          <p:cNvSpPr txBox="1"/>
+          <p:nvPr/>
+        </p:nvSpPr>
+        <p:spPr>
+          <a:xfrm>
+            <a:off x="152400" y="499987"/>
+            <a:ext cx="569387" cy="369332"/>
+          </a:xfrm>
+          <a:prstGeom prst="rect">
+            <a:avLst/>
+          </a:prstGeom>
+          <a:noFill/>
+        </p:spPr>
+        <p:txBody>
+          <a:bodyPr wrap="none" rtlCol="0">
+            <a:spAutoFit/>
+          </a:bodyPr>
+          <a:lstStyle/>
+          <a:p>
+            <a:r>
+              <a:rPr kumimoji="1" lang="en-US" altLang="ja-JP" dirty="0" smtClean="0"/>
+              <a:t>Fig3</a:t>
+            </a:r>
+          </a:p>
+        </p:txBody>
+      </p:sp>
     </p:spTree>
     <p:extLst>
       <p:ext uri="{BB962C8B-B14F-4D97-AF65-F5344CB8AC3E}">
@@ -16182,6 +16539,35 @@
           </a:extLst>
         </p:spPr>
       </p:pic>
+      <p:sp>
+        <p:nvSpPr>
+          <p:cNvPr id="13" name="テキスト ボックス 12"/>
+          <p:cNvSpPr txBox="1"/>
+          <p:nvPr/>
+        </p:nvSpPr>
+        <p:spPr>
+          <a:xfrm>
+            <a:off x="152400" y="499987"/>
+            <a:ext cx="569387" cy="369332"/>
+          </a:xfrm>
+          <a:prstGeom prst="rect">
+            <a:avLst/>
+          </a:prstGeom>
+          <a:noFill/>
+        </p:spPr>
+        <p:txBody>
+          <a:bodyPr wrap="none" rtlCol="0">
+            <a:spAutoFit/>
+          </a:bodyPr>
+          <a:lstStyle/>
+          <a:p>
+            <a:r>
+              <a:rPr kumimoji="1" lang="en-US" altLang="ja-JP" dirty="0" smtClean="0"/>
+              <a:t>Fig4</a:t>
+            </a:r>
+          </a:p>
+        </p:txBody>
+      </p:sp>
     </p:spTree>
     <p:extLst>
       <p:ext uri="{BB962C8B-B14F-4D97-AF65-F5344CB8AC3E}">
@@ -17106,6 +17492,35 @@
           </a:extLst>
         </p:spPr>
       </p:pic>
+      <p:sp>
+        <p:nvSpPr>
+          <p:cNvPr id="13" name="テキスト ボックス 12"/>
+          <p:cNvSpPr txBox="1"/>
+          <p:nvPr/>
+        </p:nvSpPr>
+        <p:spPr>
+          <a:xfrm>
+            <a:off x="152400" y="499987"/>
+            <a:ext cx="569387" cy="369332"/>
+          </a:xfrm>
+          <a:prstGeom prst="rect">
+            <a:avLst/>
+          </a:prstGeom>
+          <a:noFill/>
+        </p:spPr>
+        <p:txBody>
+          <a:bodyPr wrap="none" rtlCol="0">
+            <a:spAutoFit/>
+          </a:bodyPr>
+          <a:lstStyle/>
+          <a:p>
+            <a:r>
+              <a:rPr kumimoji="1" lang="en-US" altLang="ja-JP" dirty="0" smtClean="0"/>
+              <a:t>Fig4</a:t>
+            </a:r>
+          </a:p>
+        </p:txBody>
+      </p:sp>
     </p:spTree>
     <p:extLst>
       <p:ext uri="{BB962C8B-B14F-4D97-AF65-F5344CB8AC3E}">
@@ -22450,6 +22865,35 @@
           </a:p>
         </p:txBody>
       </p:sp>
+      <p:sp>
+        <p:nvSpPr>
+          <p:cNvPr id="109" name="テキスト ボックス 108"/>
+          <p:cNvSpPr txBox="1"/>
+          <p:nvPr/>
+        </p:nvSpPr>
+        <p:spPr>
+          <a:xfrm>
+            <a:off x="152400" y="499987"/>
+            <a:ext cx="569387" cy="369332"/>
+          </a:xfrm>
+          <a:prstGeom prst="rect">
+            <a:avLst/>
+          </a:prstGeom>
+          <a:noFill/>
+        </p:spPr>
+        <p:txBody>
+          <a:bodyPr wrap="none" rtlCol="0">
+            <a:spAutoFit/>
+          </a:bodyPr>
+          <a:lstStyle/>
+          <a:p>
+            <a:r>
+              <a:rPr kumimoji="1" lang="en-US" altLang="ja-JP" dirty="0" smtClean="0"/>
+              <a:t>Fig8</a:t>
+            </a:r>
+          </a:p>
+        </p:txBody>
+      </p:sp>
     </p:spTree>
     <p:extLst>
       <p:ext uri="{BB962C8B-B14F-4D97-AF65-F5344CB8AC3E}">
@@ -24717,13 +25161,14 @@
               <a:spcBef>
                 <a:spcPts val="0"/>
               </a:spcBef>
-              <a:buClr>
-                <a:srgbClr val="FF0000"/>
-              </a:buClr>
+              <a:buClrTx/>
               <a:defRPr/>
             </a:pPr>
             <a:r>
               <a:rPr lang="ja-JP" altLang="en-US" sz="1050" dirty="0" smtClean="0">
+                <a:solidFill>
+                  <a:schemeClr val="tx1"/>
+                </a:solidFill>
                 <a:latin typeface="メイリオ" panose="020B0604030504040204" pitchFamily="50" charset="-128"/>
                 <a:ea typeface="メイリオ" panose="020B0604030504040204" pitchFamily="50" charset="-128"/>
                 <a:cs typeface="メイリオ" panose="020B0604030504040204" pitchFamily="50" charset="-128"/>
@@ -24732,6 +25177,9 @@
             </a:r>
             <a:r>
               <a:rPr lang="en-US" altLang="ja-JP" sz="1050" dirty="0" smtClean="0">
+                <a:solidFill>
+                  <a:schemeClr val="tx1"/>
+                </a:solidFill>
                 <a:latin typeface="メイリオ" panose="020B0604030504040204" pitchFamily="50" charset="-128"/>
                 <a:ea typeface="メイリオ" panose="020B0604030504040204" pitchFamily="50" charset="-128"/>
                 <a:cs typeface="メイリオ" panose="020B0604030504040204" pitchFamily="50" charset="-128"/>
@@ -24740,6 +25188,9 @@
             </a:r>
             <a:br>
               <a:rPr lang="en-US" altLang="ja-JP" sz="1050" dirty="0" smtClean="0">
+                <a:solidFill>
+                  <a:schemeClr val="tx1"/>
+                </a:solidFill>
                 <a:latin typeface="メイリオ" panose="020B0604030504040204" pitchFamily="50" charset="-128"/>
                 <a:ea typeface="メイリオ" panose="020B0604030504040204" pitchFamily="50" charset="-128"/>
                 <a:cs typeface="メイリオ" panose="020B0604030504040204" pitchFamily="50" charset="-128"/>
@@ -24747,6 +25198,9 @@
             </a:br>
             <a:r>
               <a:rPr lang="ja-JP" altLang="en-US" sz="1050" dirty="0" smtClean="0">
+                <a:solidFill>
+                  <a:schemeClr val="tx1"/>
+                </a:solidFill>
                 <a:latin typeface="メイリオ" panose="020B0604030504040204" pitchFamily="50" charset="-128"/>
                 <a:ea typeface="メイリオ" panose="020B0604030504040204" pitchFamily="50" charset="-128"/>
                 <a:cs typeface="メイリオ" panose="020B0604030504040204" pitchFamily="50" charset="-128"/>
@@ -24754,6 +25208,9 @@
               <a:t>ソフトウェア</a:t>
             </a:r>
             <a:endParaRPr lang="en-US" altLang="ja-JP" sz="1050" dirty="0" smtClean="0">
+              <a:solidFill>
+                <a:schemeClr val="tx1"/>
+              </a:solidFill>
               <a:latin typeface="メイリオ" panose="020B0604030504040204" pitchFamily="50" charset="-128"/>
               <a:ea typeface="メイリオ" panose="020B0604030504040204" pitchFamily="50" charset="-128"/>
               <a:cs typeface="メイリオ" panose="020B0604030504040204" pitchFamily="50" charset="-128"/>
@@ -24767,13 +25224,14 @@
               <a:spcBef>
                 <a:spcPts val="0"/>
               </a:spcBef>
-              <a:buClr>
-                <a:srgbClr val="FF0000"/>
-              </a:buClr>
+              <a:buClrTx/>
               <a:defRPr/>
             </a:pPr>
             <a:r>
               <a:rPr lang="ja-JP" altLang="en-US" sz="1050" dirty="0" smtClean="0">
+                <a:solidFill>
+                  <a:schemeClr val="tx1"/>
+                </a:solidFill>
                 <a:latin typeface="メイリオ" panose="020B0604030504040204" pitchFamily="50" charset="-128"/>
                 <a:ea typeface="メイリオ" panose="020B0604030504040204" pitchFamily="50" charset="-128"/>
                 <a:cs typeface="メイリオ" panose="020B0604030504040204" pitchFamily="50" charset="-128"/>
@@ -24782,6 +25240,9 @@
             </a:r>
             <a:r>
               <a:rPr lang="en-US" altLang="ja-JP" sz="1050" dirty="0" smtClean="0">
+                <a:solidFill>
+                  <a:schemeClr val="tx1"/>
+                </a:solidFill>
                 <a:latin typeface="メイリオ" panose="020B0604030504040204" pitchFamily="50" charset="-128"/>
                 <a:ea typeface="メイリオ" panose="020B0604030504040204" pitchFamily="50" charset="-128"/>
                 <a:cs typeface="メイリオ" panose="020B0604030504040204" pitchFamily="50" charset="-128"/>
@@ -24790,6 +25251,9 @@
             </a:r>
             <a:br>
               <a:rPr lang="en-US" altLang="ja-JP" sz="1050" dirty="0" smtClean="0">
+                <a:solidFill>
+                  <a:schemeClr val="tx1"/>
+                </a:solidFill>
                 <a:latin typeface="メイリオ" panose="020B0604030504040204" pitchFamily="50" charset="-128"/>
                 <a:ea typeface="メイリオ" panose="020B0604030504040204" pitchFamily="50" charset="-128"/>
                 <a:cs typeface="メイリオ" panose="020B0604030504040204" pitchFamily="50" charset="-128"/>
@@ -24797,6 +25261,9 @@
             </a:br>
             <a:r>
               <a:rPr lang="ja-JP" altLang="en-US" sz="1050" dirty="0" smtClean="0">
+                <a:solidFill>
+                  <a:schemeClr val="tx1"/>
+                </a:solidFill>
                 <a:latin typeface="メイリオ" panose="020B0604030504040204" pitchFamily="50" charset="-128"/>
                 <a:ea typeface="メイリオ" panose="020B0604030504040204" pitchFamily="50" charset="-128"/>
                 <a:cs typeface="メイリオ" panose="020B0604030504040204" pitchFamily="50" charset="-128"/>
@@ -24804,6 +25271,9 @@
               <a:t>ソフトウェア</a:t>
             </a:r>
             <a:endParaRPr lang="en-US" altLang="ja-JP" sz="1050" dirty="0" smtClean="0">
+              <a:solidFill>
+                <a:schemeClr val="tx1"/>
+              </a:solidFill>
               <a:latin typeface="メイリオ" panose="020B0604030504040204" pitchFamily="50" charset="-128"/>
               <a:ea typeface="メイリオ" panose="020B0604030504040204" pitchFamily="50" charset="-128"/>
               <a:cs typeface="メイリオ" panose="020B0604030504040204" pitchFamily="50" charset="-128"/>
@@ -24817,13 +25287,14 @@
               <a:spcBef>
                 <a:spcPts val="0"/>
               </a:spcBef>
-              <a:buClr>
-                <a:srgbClr val="FF0000"/>
-              </a:buClr>
+              <a:buClrTx/>
               <a:defRPr/>
             </a:pPr>
             <a:r>
               <a:rPr lang="ja-JP" altLang="en-US" sz="1050" dirty="0" smtClean="0">
+                <a:solidFill>
+                  <a:schemeClr val="tx1"/>
+                </a:solidFill>
                 <a:latin typeface="メイリオ" panose="020B0604030504040204" pitchFamily="50" charset="-128"/>
                 <a:ea typeface="メイリオ" panose="020B0604030504040204" pitchFamily="50" charset="-128"/>
                 <a:cs typeface="メイリオ" panose="020B0604030504040204" pitchFamily="50" charset="-128"/>
@@ -25737,9 +26208,7 @@
               <a:spcBef>
                 <a:spcPts val="0"/>
               </a:spcBef>
-              <a:buClr>
-                <a:srgbClr val="FF0000"/>
-              </a:buClr>
+              <a:buClrTx/>
               <a:defRPr/>
             </a:pPr>
             <a:r>
@@ -25783,9 +26252,7 @@
               <a:spcBef>
                 <a:spcPts val="0"/>
               </a:spcBef>
-              <a:buClr>
-                <a:srgbClr val="FF0000"/>
-              </a:buClr>
+              <a:buClrTx/>
               <a:defRPr/>
             </a:pPr>
             <a:r>
@@ -25842,9 +26309,7 @@
               <a:spcBef>
                 <a:spcPts val="0"/>
               </a:spcBef>
-              <a:buClr>
-                <a:srgbClr val="FF0000"/>
-              </a:buClr>
+              <a:buClrTx/>
               <a:defRPr/>
             </a:pPr>
             <a:r>
@@ -25978,7 +26443,7 @@
         </p:nvSpPr>
         <p:spPr bwMode="auto">
           <a:xfrm rot="20161803">
-            <a:off x="3336267" y="2053628"/>
+            <a:off x="3351015" y="1965363"/>
             <a:ext cx="967767" cy="294481"/>
           </a:xfrm>
           <a:prstGeom prst="rect">
@@ -26206,7 +26671,7 @@
         </p:nvSpPr>
         <p:spPr bwMode="auto">
           <a:xfrm rot="20161803">
-            <a:off x="4128271" y="3712579"/>
+            <a:off x="4039783" y="3815815"/>
             <a:ext cx="967767" cy="294481"/>
           </a:xfrm>
           <a:prstGeom prst="rect">
@@ -26434,7 +26899,7 @@
         </p:nvSpPr>
         <p:spPr bwMode="auto">
           <a:xfrm rot="20161803">
-            <a:off x="4319578" y="1996707"/>
+            <a:off x="4329168" y="1906371"/>
             <a:ext cx="967767" cy="294481"/>
           </a:xfrm>
           <a:prstGeom prst="rect">
@@ -26672,7 +27137,7 @@
         </p:nvSpPr>
         <p:spPr bwMode="auto">
           <a:xfrm rot="20161803">
-            <a:off x="4936186" y="3730146"/>
+            <a:off x="4953675" y="3786319"/>
             <a:ext cx="967767" cy="294481"/>
           </a:xfrm>
           <a:prstGeom prst="rect">
@@ -26900,7 +27365,7 @@
         </p:nvSpPr>
         <p:spPr bwMode="auto">
           <a:xfrm rot="20161803">
-            <a:off x="5165327" y="2006302"/>
+            <a:off x="5248329" y="1906371"/>
             <a:ext cx="967767" cy="294481"/>
           </a:xfrm>
           <a:prstGeom prst="rect">
@@ -27128,7 +27593,7 @@
         </p:nvSpPr>
         <p:spPr bwMode="auto">
           <a:xfrm rot="20161803">
-            <a:off x="5858523" y="3694529"/>
+            <a:off x="5779079" y="3786319"/>
             <a:ext cx="967767" cy="294481"/>
           </a:xfrm>
           <a:prstGeom prst="rect">
@@ -27356,7 +27821,7 @@
         </p:nvSpPr>
         <p:spPr bwMode="auto">
           <a:xfrm rot="20161803">
-            <a:off x="6036056" y="1982868"/>
+            <a:off x="6034758" y="1935867"/>
             <a:ext cx="1119245" cy="294481"/>
           </a:xfrm>
           <a:prstGeom prst="rect">
@@ -27584,7 +28049,7 @@
         </p:nvSpPr>
         <p:spPr bwMode="auto">
           <a:xfrm rot="20161803">
-            <a:off x="6707720" y="3732921"/>
+            <a:off x="6737216" y="3759484"/>
             <a:ext cx="967767" cy="230166"/>
           </a:xfrm>
           <a:prstGeom prst="rect">
@@ -27812,7 +28277,7 @@
         </p:nvSpPr>
         <p:spPr bwMode="auto">
           <a:xfrm rot="20161803">
-            <a:off x="7061153" y="1962921"/>
+            <a:off x="7061153" y="1953276"/>
             <a:ext cx="967767" cy="230166"/>
           </a:xfrm>
           <a:prstGeom prst="rect">
@@ -28027,6 +28492,35 @@
               <a:latin typeface="ゴシック" panose="020B0609070205080204" pitchFamily="49" charset="-128"/>
               <a:ea typeface="ゴシック" panose="020B0609070205080204" pitchFamily="49" charset="-128"/>
             </a:endParaRPr>
+          </a:p>
+        </p:txBody>
+      </p:sp>
+      <p:sp>
+        <p:nvSpPr>
+          <p:cNvPr id="109" name="テキスト ボックス 108"/>
+          <p:cNvSpPr txBox="1"/>
+          <p:nvPr/>
+        </p:nvSpPr>
+        <p:spPr>
+          <a:xfrm>
+            <a:off x="152400" y="499987"/>
+            <a:ext cx="569387" cy="369332"/>
+          </a:xfrm>
+          <a:prstGeom prst="rect">
+            <a:avLst/>
+          </a:prstGeom>
+          <a:noFill/>
+        </p:spPr>
+        <p:txBody>
+          <a:bodyPr wrap="none" rtlCol="0">
+            <a:spAutoFit/>
+          </a:bodyPr>
+          <a:lstStyle/>
+          <a:p>
+            <a:r>
+              <a:rPr kumimoji="1" lang="en-US" altLang="ja-JP" dirty="0" smtClean="0"/>
+              <a:t>Fig8</a:t>
+            </a:r>
           </a:p>
         </p:txBody>
       </p:sp>
@@ -29314,7 +29808,7 @@
                 <a14:useLocalDpi xmlns:a14="http://schemas.microsoft.com/office/drawing/2010/main" val="0"/>
               </a:ext>
               <a:ext uri="{96DAC541-7B7A-43D3-8B79-37D633B846F1}">
-                <asvg:svgBlip xmlns:asvg="http://schemas.microsoft.com/office/drawing/2016/SVG/main" xmlns="" r:embed="rId25"/>
+                <asvg:svgBlip xmlns="" xmlns:asvg="http://schemas.microsoft.com/office/drawing/2016/SVG/main" r:embed="rId25"/>
               </a:ext>
             </a:extLst>
           </a:blip>
@@ -29512,9 +30006,8 @@
           <a:p>
             <a:r>
               <a:rPr kumimoji="1" lang="en-US" altLang="ja-JP" dirty="0" smtClean="0"/>
-              <a:t>Fig6</a:t>
-            </a:r>
-            <a:endParaRPr kumimoji="1" lang="ja-JP" altLang="en-US" dirty="0"/>
+              <a:t>Fig5</a:t>
+            </a:r>
           </a:p>
         </p:txBody>
       </p:sp>
@@ -29796,7 +30289,7 @@
   <a:extraClrSchemeLst/>
   <a:extLst>
     <a:ext uri="{05A4C25C-085E-4340-85A3-A5531E510DB2}">
-      <thm15:themeFamily xmlns:thm15="http://schemas.microsoft.com/office/thememl/2012/main" xmlns="" name="Office Theme" id="{62F939B6-93AF-4DB8-9C6B-D6C7DFDC589F}" vid="{4A3C46E8-61CC-4603-A589-7422A47A8E4A}"/>
+      <thm15:themeFamily xmlns="" xmlns:thm15="http://schemas.microsoft.com/office/thememl/2012/main" name="Office Theme" id="{62F939B6-93AF-4DB8-9C6B-D6C7DFDC589F}" vid="{4A3C46E8-61CC-4603-A589-7422A47A8E4A}"/>
     </a:ext>
   </a:extLst>
 </a:theme>
@@ -30057,7 +30550,7 @@
   <a:extraClrSchemeLst/>
   <a:extLst>
     <a:ext uri="{05A4C25C-085E-4340-85A3-A5531E510DB2}">
-      <thm15:themeFamily xmlns:thm15="http://schemas.microsoft.com/office/thememl/2012/main" xmlns="" name="Office Theme" id="{62F939B6-93AF-4DB8-9C6B-D6C7DFDC589F}" vid="{4A3C46E8-61CC-4603-A589-7422A47A8E4A}"/>
+      <thm15:themeFamily xmlns="" xmlns:thm15="http://schemas.microsoft.com/office/thememl/2012/main" name="Office Theme" id="{62F939B6-93AF-4DB8-9C6B-D6C7DFDC589F}" vid="{4A3C46E8-61CC-4603-A589-7422A47A8E4A}"/>
     </a:ext>
   </a:extLst>
 </a:theme>
@@ -30318,7 +30811,7 @@
   <a:extraClrSchemeLst/>
   <a:extLst>
     <a:ext uri="{05A4C25C-085E-4340-85A3-A5531E510DB2}">
-      <thm15:themeFamily xmlns:thm15="http://schemas.microsoft.com/office/thememl/2012/main" xmlns="" name="Office Theme" id="{62F939B6-93AF-4DB8-9C6B-D6C7DFDC589F}" vid="{4A3C46E8-61CC-4603-A589-7422A47A8E4A}"/>
+      <thm15:themeFamily xmlns="" xmlns:thm15="http://schemas.microsoft.com/office/thememl/2012/main" name="Office Theme" id="{62F939B6-93AF-4DB8-9C6B-D6C7DFDC589F}" vid="{4A3C46E8-61CC-4603-A589-7422A47A8E4A}"/>
     </a:ext>
   </a:extLst>
 </a:theme>

</xml_diff>

<commit_message>
RC3 ( for Original Update) and InDesign file preparation
</commit_message>
<xml_diff>
--- a/OPEN SOURCE AUDITS IN MERGER AND ACQUISITION TRANSACTIONS/RC/Figures_M&A_paper_JP.pptx
+++ b/OPEN SOURCE AUDITS IN MERGER AND ACQUISITION TRANSACTIONS/RC/Figures_M&A_paper_JP.pptx
@@ -125,7 +125,7 @@
   </p:defaultTextStyle>
   <p:extLst>
     <p:ext uri="{EFAFB233-063F-42B5-8137-9DF3F51BA10A}">
-      <p15:sldGuideLst xmlns="" xmlns:p15="http://schemas.microsoft.com/office/powerpoint/2012/main">
+      <p15:sldGuideLst xmlns:p15="http://schemas.microsoft.com/office/powerpoint/2012/main" xmlns="">
         <p15:guide id="1" orient="horz" pos="2296" userDrawn="1">
           <p15:clr>
             <a:srgbClr val="A4A3A4"/>
@@ -139,7 +139,7 @@
       </p15:sldGuideLst>
     </p:ext>
     <p:ext uri="{2D200454-40CA-4A62-9FC3-DE9A4176ACB9}">
-      <p15:notesGuideLst xmlns="" xmlns:p15="http://schemas.microsoft.com/office/powerpoint/2012/main"/>
+      <p15:notesGuideLst xmlns:p15="http://schemas.microsoft.com/office/powerpoint/2012/main" xmlns=""/>
     </p:ext>
   </p:extLst>
 </p:presentation>
@@ -227,7 +227,7 @@
           <a:p>
             <a:fld id="{E6FDABA1-4B5D-4D1A-B9E0-E772E7058171}" type="datetimeFigureOut">
               <a:rPr lang="sv-SE" smtClean="0"/>
-              <a:t>2018-01-13</a:t>
+              <a:t>2018-01-28</a:t>
             </a:fld>
             <a:endParaRPr lang="sv-SE"/>
           </a:p>
@@ -392,7 +392,7 @@
           <a:p>
             <a:fld id="{DE46D2F7-F797-442B-A22D-84CBF0D5BA4F}" type="datetimeFigureOut">
               <a:rPr lang="sv-SE" smtClean="0"/>
-              <a:t>2018-01-13</a:t>
+              <a:t>2018-01-28</a:t>
             </a:fld>
             <a:endParaRPr lang="sv-SE"/>
           </a:p>
@@ -2104,7 +2104,7 @@
           <a:p>
             <a:fld id="{644446D9-CA4E-47F7-ADA0-1C514647DC66}" type="datetimeFigureOut">
               <a:rPr lang="en-US" smtClean="0"/>
-              <a:t>1/13/2018</a:t>
+              <a:t>1/28/2018</a:t>
             </a:fld>
             <a:endParaRPr lang="en-US"/>
           </a:p>
@@ -2274,7 +2274,7 @@
           <a:p>
             <a:fld id="{644446D9-CA4E-47F7-ADA0-1C514647DC66}" type="datetimeFigureOut">
               <a:rPr lang="en-US" smtClean="0"/>
-              <a:t>1/13/2018</a:t>
+              <a:t>1/28/2018</a:t>
             </a:fld>
             <a:endParaRPr lang="en-US"/>
           </a:p>
@@ -2454,7 +2454,7 @@
           <a:p>
             <a:fld id="{644446D9-CA4E-47F7-ADA0-1C514647DC66}" type="datetimeFigureOut">
               <a:rPr lang="en-US" smtClean="0"/>
-              <a:t>1/13/2018</a:t>
+              <a:t>1/28/2018</a:t>
             </a:fld>
             <a:endParaRPr lang="en-US"/>
           </a:p>
@@ -2624,7 +2624,7 @@
           <a:p>
             <a:fld id="{644446D9-CA4E-47F7-ADA0-1C514647DC66}" type="datetimeFigureOut">
               <a:rPr lang="en-US" smtClean="0"/>
-              <a:t>1/13/2018</a:t>
+              <a:t>1/28/2018</a:t>
             </a:fld>
             <a:endParaRPr lang="en-US"/>
           </a:p>
@@ -2870,7 +2870,7 @@
           <a:p>
             <a:fld id="{644446D9-CA4E-47F7-ADA0-1C514647DC66}" type="datetimeFigureOut">
               <a:rPr lang="en-US" smtClean="0"/>
-              <a:t>1/13/2018</a:t>
+              <a:t>1/28/2018</a:t>
             </a:fld>
             <a:endParaRPr lang="en-US"/>
           </a:p>
@@ -3102,7 +3102,7 @@
           <a:p>
             <a:fld id="{644446D9-CA4E-47F7-ADA0-1C514647DC66}" type="datetimeFigureOut">
               <a:rPr lang="en-US" smtClean="0"/>
-              <a:t>1/13/2018</a:t>
+              <a:t>1/28/2018</a:t>
             </a:fld>
             <a:endParaRPr lang="en-US"/>
           </a:p>
@@ -3469,7 +3469,7 @@
           <a:p>
             <a:fld id="{644446D9-CA4E-47F7-ADA0-1C514647DC66}" type="datetimeFigureOut">
               <a:rPr lang="en-US" smtClean="0"/>
-              <a:t>1/13/2018</a:t>
+              <a:t>1/28/2018</a:t>
             </a:fld>
             <a:endParaRPr lang="en-US"/>
           </a:p>
@@ -3587,7 +3587,7 @@
           <a:p>
             <a:fld id="{644446D9-CA4E-47F7-ADA0-1C514647DC66}" type="datetimeFigureOut">
               <a:rPr lang="en-US" smtClean="0"/>
-              <a:t>1/13/2018</a:t>
+              <a:t>1/28/2018</a:t>
             </a:fld>
             <a:endParaRPr lang="en-US"/>
           </a:p>
@@ -3682,7 +3682,7 @@
           <a:p>
             <a:fld id="{644446D9-CA4E-47F7-ADA0-1C514647DC66}" type="datetimeFigureOut">
               <a:rPr lang="en-US" smtClean="0"/>
-              <a:t>1/13/2018</a:t>
+              <a:t>1/28/2018</a:t>
             </a:fld>
             <a:endParaRPr lang="en-US"/>
           </a:p>
@@ -3959,7 +3959,7 @@
           <a:p>
             <a:fld id="{644446D9-CA4E-47F7-ADA0-1C514647DC66}" type="datetimeFigureOut">
               <a:rPr lang="en-US" smtClean="0"/>
-              <a:t>1/13/2018</a:t>
+              <a:t>1/28/2018</a:t>
             </a:fld>
             <a:endParaRPr lang="en-US"/>
           </a:p>
@@ -4212,7 +4212,7 @@
           <a:p>
             <a:fld id="{644446D9-CA4E-47F7-ADA0-1C514647DC66}" type="datetimeFigureOut">
               <a:rPr lang="en-US" smtClean="0"/>
-              <a:t>1/13/2018</a:t>
+              <a:t>1/28/2018</a:t>
             </a:fld>
             <a:endParaRPr lang="en-US"/>
           </a:p>
@@ -4425,7 +4425,7 @@
           <a:p>
             <a:fld id="{644446D9-CA4E-47F7-ADA0-1C514647DC66}" type="datetimeFigureOut">
               <a:rPr lang="en-US" smtClean="0"/>
-              <a:t>1/13/2018</a:t>
+              <a:t>1/28/2018</a:t>
             </a:fld>
             <a:endParaRPr lang="en-US"/>
           </a:p>
@@ -5917,7 +5917,7 @@
                 <a14:useLocalDpi xmlns:a14="http://schemas.microsoft.com/office/drawing/2010/main" val="0"/>
               </a:ext>
               <a:ext uri="{96DAC541-7B7A-43D3-8B79-37D633B846F1}">
-                <asvg:svgBlip xmlns="" xmlns:asvg="http://schemas.microsoft.com/office/drawing/2016/SVG/main" r:embed="rId25"/>
+                <asvg:svgBlip xmlns:asvg="http://schemas.microsoft.com/office/drawing/2016/SVG/main" xmlns="" r:embed="rId25"/>
               </a:ext>
             </a:extLst>
           </a:blip>
@@ -6127,15 +6127,7 @@
                 <a:ea typeface="メイリオ" panose="020B0604030504040204" pitchFamily="50" charset="-128"/>
                 <a:cs typeface="メイリオ" panose="020B0604030504040204" pitchFamily="50" charset="-128"/>
               </a:rPr>
-              <a:t>プロジェクトをキックオフし、すべての関係組織の窓口担当を紹</a:t>
-            </a:r>
-            <a:r>
-              <a:rPr lang="ja-JP" altLang="en-US" sz="1100" dirty="0" smtClean="0">
-                <a:latin typeface="メイリオ" panose="020B0604030504040204" pitchFamily="50" charset="-128"/>
-                <a:ea typeface="メイリオ" panose="020B0604030504040204" pitchFamily="50" charset="-128"/>
-                <a:cs typeface="メイリオ" panose="020B0604030504040204" pitchFamily="50" charset="-128"/>
-              </a:rPr>
-              <a:t>介し</a:t>
+              <a:t>プロジェクトをキックオフし、すべての関係組織の窓口担当を紹介し</a:t>
             </a:r>
             <a:r>
               <a:rPr lang="ja-JP" altLang="en-US" sz="1100" dirty="0">
@@ -6151,15 +6143,7 @@
                 <a:ea typeface="メイリオ" panose="020B0604030504040204" pitchFamily="50" charset="-128"/>
                 <a:cs typeface="メイリオ" panose="020B0604030504040204" pitchFamily="50" charset="-128"/>
               </a:rPr>
-              <a:t>に</a:t>
-            </a:r>
-            <a:r>
-              <a:rPr lang="ja-JP" altLang="en-US" sz="1100" dirty="0" smtClean="0">
-                <a:latin typeface="メイリオ" panose="020B0604030504040204" pitchFamily="50" charset="-128"/>
-                <a:ea typeface="メイリオ" panose="020B0604030504040204" pitchFamily="50" charset="-128"/>
-                <a:cs typeface="メイリオ" panose="020B0604030504040204" pitchFamily="50" charset="-128"/>
-              </a:rPr>
-              <a:t>関する詳細情報を伝えます。</a:t>
+              <a:t>に関する詳細情報を伝えます。</a:t>
             </a:r>
             <a:endParaRPr lang="sv-SE" sz="1100" dirty="0">
               <a:latin typeface="メイリオ" panose="020B0604030504040204" pitchFamily="50" charset="-128"/>
@@ -6353,15 +6337,7 @@
             </a:r>
             <a:r>
               <a:rPr lang="ja-JP" altLang="en-US" dirty="0" smtClean="0"/>
-              <a:t>企業</a:t>
-            </a:r>
-            <a:r>
-              <a:rPr lang="ja-JP" altLang="en-US" dirty="0" smtClean="0"/>
-              <a:t>に対し、</a:t>
-            </a:r>
-            <a:r>
-              <a:rPr lang="ja-JP" altLang="en-US" dirty="0" smtClean="0"/>
-              <a:t>最終的なレポートが部品表</a:t>
+              <a:t>企業に対し、最終的なレポートが部品表</a:t>
             </a:r>
             <a:r>
               <a:rPr lang="ja-JP" altLang="en-US" dirty="0"/>
@@ -8847,23 +8823,7 @@
                 <a:ea typeface="メイリオ" panose="020B0604030504040204" pitchFamily="50" charset="-128"/>
                 <a:cs typeface="メイリオ" panose="020B0604030504040204" pitchFamily="50" charset="-128"/>
               </a:rPr>
-              <a:t>プロジェクトをキックオフし、すべての関係組織の窓口担当を紹介</a:t>
-            </a:r>
-            <a:r>
-              <a:rPr lang="ja-JP" altLang="en-US" sz="1100" dirty="0" smtClean="0">
-                <a:latin typeface="メイリオ" panose="020B0604030504040204" pitchFamily="50" charset="-128"/>
-                <a:ea typeface="メイリオ" panose="020B0604030504040204" pitchFamily="50" charset="-128"/>
-                <a:cs typeface="メイリオ" panose="020B0604030504040204" pitchFamily="50" charset="-128"/>
-              </a:rPr>
-              <a:t>し監査に</a:t>
-            </a:r>
-            <a:r>
-              <a:rPr lang="ja-JP" altLang="en-US" sz="1100" dirty="0" smtClean="0">
-                <a:latin typeface="メイリオ" panose="020B0604030504040204" pitchFamily="50" charset="-128"/>
-                <a:ea typeface="メイリオ" panose="020B0604030504040204" pitchFamily="50" charset="-128"/>
-                <a:cs typeface="メイリオ" panose="020B0604030504040204" pitchFamily="50" charset="-128"/>
-              </a:rPr>
-              <a:t>関する詳細情報を伝えます。</a:t>
+              <a:t>プロジェクトをキックオフし、すべての関係組織の窓口担当を紹介し監査に関する詳細情報を伝えます。</a:t>
             </a:r>
             <a:endParaRPr lang="sv-SE" sz="1100" dirty="0">
               <a:latin typeface="メイリオ" panose="020B0604030504040204" pitchFamily="50" charset="-128"/>
@@ -8963,11 +8923,7 @@
             </a:r>
             <a:r>
               <a:rPr lang="ja-JP" altLang="en-US" dirty="0" smtClean="0"/>
-              <a:t>に買収対象</a:t>
-            </a:r>
-            <a:r>
-              <a:rPr lang="ja-JP" altLang="en-US" dirty="0" smtClean="0"/>
-              <a:t>企業</a:t>
+              <a:t>に買収対象企業</a:t>
             </a:r>
             <a:r>
               <a:rPr lang="ja-JP" altLang="en-US" dirty="0"/>
@@ -9169,15 +9125,7 @@
             </a:r>
             <a:r>
               <a:rPr lang="ja-JP" altLang="en-US" dirty="0" smtClean="0"/>
-              <a:t>社が収集した電子署名を使い彼らのオープンソースデータベースを検索し、オープンソースのファイルやスニペット</a:t>
-            </a:r>
-            <a:r>
-              <a:rPr lang="ja-JP" altLang="en-US" dirty="0" smtClean="0"/>
-              <a:t>と一致する</a:t>
-            </a:r>
-            <a:r>
-              <a:rPr lang="ja-JP" altLang="en-US" dirty="0" smtClean="0"/>
-              <a:t>ものを探していきます。</a:t>
+              <a:t>社が収集した電子署名を使い彼らのオープンソースデータベースを検索し、オープンソースのファイルやスニペットと一致するものを探していきます。</a:t>
             </a:r>
             <a:endParaRPr lang="sv-SE" dirty="0"/>
           </a:p>
@@ -9419,11 +9367,7 @@
             </a:r>
             <a:r>
               <a:rPr lang="ja-JP" altLang="en-US" dirty="0" smtClean="0"/>
-              <a:t>、将来の</a:t>
-            </a:r>
-            <a:r>
-              <a:rPr lang="ja-JP" altLang="en-US" dirty="0" smtClean="0"/>
-              <a:t>買収企業と</a:t>
+              <a:t>、将来の買収企業と</a:t>
             </a:r>
             <a:r>
               <a:rPr lang="ja-JP" altLang="en-US" dirty="0"/>
@@ -9675,11 +9619,7 @@
             </a:r>
             <a:r>
               <a:rPr lang="ja-JP" altLang="en-US" dirty="0"/>
-              <a:t>の買収企業</a:t>
-            </a:r>
-            <a:r>
-              <a:rPr lang="ja-JP" altLang="en-US" dirty="0"/>
-              <a:t>へ、最終的なレポート</a:t>
+              <a:t>の買収企業へ、最終的なレポート</a:t>
             </a:r>
             <a:r>
               <a:rPr lang="ja-JP" altLang="en-US" dirty="0" smtClean="0"/>
@@ -12653,11 +12593,7 @@
           <a:p>
             <a:r>
               <a:rPr lang="ja-JP" altLang="en-US" dirty="0" smtClean="0"/>
-              <a:t>買収対象</a:t>
-            </a:r>
-            <a:r>
-              <a:rPr lang="ja-JP" altLang="en-US" dirty="0" smtClean="0"/>
-              <a:t>企業が</a:t>
+              <a:t>買収対象企業が</a:t>
             </a:r>
             <a:r>
               <a:rPr lang="en-US" altLang="ja-JP" dirty="0" smtClean="0"/>
@@ -12755,15 +12691,7 @@
             </a:r>
             <a:r>
               <a:rPr lang="ja-JP" altLang="en-US" dirty="0" smtClean="0"/>
-              <a:t>社が買収対象</a:t>
-            </a:r>
-            <a:r>
-              <a:rPr lang="ja-JP" altLang="en-US" dirty="0" smtClean="0"/>
-              <a:t>企業向けに、ツールの操作方法（スキャン実行、レビュー結果、レポート生成）を説明</a:t>
-            </a:r>
-            <a:r>
-              <a:rPr lang="ja-JP" altLang="en-US" dirty="0" smtClean="0"/>
-              <a:t>する</a:t>
+              <a:t>社が買収対象企業向けに、ツールの操作方法（スキャン実行、レビュー結果、レポート生成）を説明する</a:t>
             </a:r>
             <a:r>
               <a:rPr lang="ja-JP" altLang="en-US" dirty="0"/>
@@ -12771,11 +12699,7 @@
             </a:r>
             <a:r>
               <a:rPr lang="ja-JP" altLang="en-US" dirty="0" smtClean="0"/>
-              <a:t>、</a:t>
-            </a:r>
-            <a:r>
-              <a:rPr lang="ja-JP" altLang="en-US" dirty="0" smtClean="0"/>
-              <a:t>最初のセッションを実施します。</a:t>
+              <a:t>、最初のセッションを実施します。</a:t>
             </a:r>
             <a:endParaRPr lang="sv-SE" dirty="0"/>
           </a:p>
@@ -12865,11 +12789,7 @@
             </a:r>
             <a:r>
               <a:rPr lang="ja-JP" altLang="en-US" dirty="0" smtClean="0"/>
-              <a:t>社が買収対象</a:t>
-            </a:r>
-            <a:r>
-              <a:rPr lang="ja-JP" altLang="en-US" dirty="0" smtClean="0"/>
-              <a:t>企業に対し、期間限定で</a:t>
+              <a:t>社が買収対象企業に対し、期間限定で</a:t>
             </a:r>
             <a:r>
               <a:rPr lang="ja-JP" altLang="en-US" dirty="0"/>
@@ -13031,15 +12951,7 @@
           <a:p>
             <a:r>
               <a:rPr lang="ja-JP" altLang="en-US" dirty="0" smtClean="0"/>
-              <a:t>買収対象</a:t>
-            </a:r>
-            <a:r>
-              <a:rPr lang="ja-JP" altLang="en-US" dirty="0" smtClean="0"/>
-              <a:t>企業</a:t>
-            </a:r>
-            <a:r>
-              <a:rPr lang="ja-JP" altLang="en-US" dirty="0" smtClean="0"/>
-              <a:t>がコードを監査できるようになり、すべてのファイルやスニペットについて</a:t>
+              <a:t>買収対象企業がコードを監査できるようになり、すべてのファイルやスニペットについて</a:t>
             </a:r>
             <a:r>
               <a:rPr lang="en-US" altLang="ja-JP" dirty="0" smtClean="0"/>
@@ -13047,15 +12959,7 @@
             </a:r>
             <a:r>
               <a:rPr lang="ja-JP" altLang="en-US" dirty="0" smtClean="0"/>
-              <a:t>の</a:t>
-            </a:r>
-            <a:r>
-              <a:rPr lang="ja-JP" altLang="en-US" dirty="0" smtClean="0"/>
-              <a:t>オープンソース データベース</a:t>
-            </a:r>
-            <a:r>
-              <a:rPr lang="ja-JP" altLang="en-US" dirty="0" smtClean="0"/>
-              <a:t>との</a:t>
+              <a:t>のオープンソース データベースとの</a:t>
             </a:r>
             <a:r>
               <a:rPr lang="ja-JP" altLang="en-US" dirty="0"/>
@@ -13063,11 +12967,7 @@
             </a:r>
             <a:r>
               <a:rPr lang="ja-JP" altLang="en-US" dirty="0" smtClean="0"/>
-              <a:t>を</a:t>
-            </a:r>
-            <a:r>
-              <a:rPr lang="ja-JP" altLang="en-US" dirty="0" smtClean="0"/>
-              <a:t>調査し、部品表（</a:t>
+              <a:t>を調査し、部品表（</a:t>
             </a:r>
             <a:r>
               <a:rPr lang="en-US" altLang="ja-JP" dirty="0" smtClean="0"/>
@@ -13197,15 +13097,7 @@
             </a:r>
             <a:r>
               <a:rPr lang="ja-JP" altLang="en-US" dirty="0" smtClean="0"/>
-              <a:t>のシステムから消去されます</a:t>
-            </a:r>
-            <a:r>
-              <a:rPr lang="ja-JP" altLang="en-US" dirty="0" smtClean="0"/>
-              <a:t>。買収対象</a:t>
-            </a:r>
-            <a:r>
-              <a:rPr lang="ja-JP" altLang="en-US" dirty="0" smtClean="0"/>
-              <a:t>企業には</a:t>
+              <a:t>のシステムから消去されます。買収対象企業には</a:t>
             </a:r>
             <a:r>
               <a:rPr lang="ja-JP" altLang="en-US" dirty="0"/>
@@ -14183,15 +14075,7 @@
                 <a:ea typeface="メイリオ" panose="020B0604030504040204" pitchFamily="50" charset="-128"/>
                 <a:cs typeface="メイリオ" panose="020B0604030504040204" pitchFamily="50" charset="-128"/>
               </a:rPr>
-              <a:t>プロジェクトをキックオフし、すべての関係組織の窓口担当を紹</a:t>
-            </a:r>
-            <a:r>
-              <a:rPr lang="ja-JP" altLang="en-US" sz="1100" dirty="0" smtClean="0">
-                <a:latin typeface="メイリオ" panose="020B0604030504040204" pitchFamily="50" charset="-128"/>
-                <a:ea typeface="メイリオ" panose="020B0604030504040204" pitchFamily="50" charset="-128"/>
-                <a:cs typeface="メイリオ" panose="020B0604030504040204" pitchFamily="50" charset="-128"/>
-              </a:rPr>
-              <a:t>介し</a:t>
+              <a:t>プロジェクトをキックオフし、すべての関係組織の窓口担当を紹介し</a:t>
             </a:r>
             <a:r>
               <a:rPr lang="ja-JP" altLang="en-US" sz="1100" dirty="0">
@@ -14207,15 +14091,7 @@
                 <a:ea typeface="メイリオ" panose="020B0604030504040204" pitchFamily="50" charset="-128"/>
                 <a:cs typeface="メイリオ" panose="020B0604030504040204" pitchFamily="50" charset="-128"/>
               </a:rPr>
-              <a:t>に</a:t>
-            </a:r>
-            <a:r>
-              <a:rPr lang="ja-JP" altLang="en-US" sz="1100" dirty="0" smtClean="0">
-                <a:latin typeface="メイリオ" panose="020B0604030504040204" pitchFamily="50" charset="-128"/>
-                <a:ea typeface="メイリオ" panose="020B0604030504040204" pitchFamily="50" charset="-128"/>
-                <a:cs typeface="メイリオ" panose="020B0604030504040204" pitchFamily="50" charset="-128"/>
-              </a:rPr>
-              <a:t>関する詳細情報を伝えます。</a:t>
+              <a:t>に関する詳細情報を伝えます。</a:t>
             </a:r>
             <a:endParaRPr lang="sv-SE" sz="1100" dirty="0">
               <a:latin typeface="メイリオ" panose="020B0604030504040204" pitchFamily="50" charset="-128"/>
@@ -14315,11 +14191,7 @@
             </a:r>
             <a:r>
               <a:rPr lang="ja-JP" altLang="en-US" dirty="0" smtClean="0"/>
-              <a:t>に買収対象</a:t>
-            </a:r>
-            <a:r>
-              <a:rPr lang="ja-JP" altLang="en-US" dirty="0" smtClean="0"/>
-              <a:t>企業</a:t>
+              <a:t>に買収対象企業</a:t>
             </a:r>
             <a:r>
               <a:rPr lang="ja-JP" altLang="en-US" dirty="0"/>
@@ -15687,7 +15559,7 @@
         <p:spPr>
           <a:xfrm>
             <a:off x="5897166" y="1977136"/>
-            <a:ext cx="1863011" cy="307777"/>
+            <a:ext cx="2198038" cy="307777"/>
           </a:xfrm>
           <a:prstGeom prst="rect">
             <a:avLst/>
@@ -15701,30 +15573,22 @@
           <a:lstStyle/>
           <a:p>
             <a:r>
-              <a:rPr lang="ja-JP" altLang="en-US" sz="1400" b="1" smtClean="0">
+              <a:rPr lang="ja-JP" altLang="en-US" sz="1400" b="1" dirty="0" smtClean="0">
                 <a:latin typeface="メイリオ" panose="020B0604030504040204" pitchFamily="50" charset="-128"/>
                 <a:ea typeface="メイリオ" panose="020B0604030504040204" pitchFamily="50" charset="-128"/>
                 <a:cs typeface="メイリオ" panose="020B0604030504040204" pitchFamily="50" charset="-128"/>
               </a:rPr>
-              <a:t>コードの追加</a:t>
-            </a:r>
-            <a:r>
-              <a:rPr lang="ja-JP" altLang="en-US" sz="900" b="1" smtClean="0">
-                <a:latin typeface="メイリオ" panose="020B0604030504040204" pitchFamily="50" charset="-128"/>
-                <a:ea typeface="メイリオ" panose="020B0604030504040204" pitchFamily="50" charset="-128"/>
-                <a:cs typeface="メイリオ" panose="020B0604030504040204" pitchFamily="50" charset="-128"/>
-              </a:rPr>
-              <a:t>（</a:t>
-            </a:r>
-            <a:r>
-              <a:rPr lang="en-US" altLang="ja-JP" sz="900" b="1" smtClean="0">
+              <a:t>コードの追加（</a:t>
+            </a:r>
+            <a:r>
+              <a:rPr lang="en-US" altLang="ja-JP" sz="1400" b="1" dirty="0" smtClean="0">
                 <a:latin typeface="メイリオ" panose="020B0604030504040204" pitchFamily="50" charset="-128"/>
                 <a:ea typeface="メイリオ" panose="020B0604030504040204" pitchFamily="50" charset="-128"/>
                 <a:cs typeface="メイリオ" panose="020B0604030504040204" pitchFamily="50" charset="-128"/>
               </a:rPr>
               <a:t>Adding)</a:t>
             </a:r>
-            <a:endParaRPr lang="en-US" sz="900" b="1" dirty="0">
+            <a:endParaRPr lang="en-US" sz="1400" b="1" dirty="0">
               <a:latin typeface="メイリオ" panose="020B0604030504040204" pitchFamily="50" charset="-128"/>
               <a:ea typeface="メイリオ" panose="020B0604030504040204" pitchFamily="50" charset="-128"/>
               <a:cs typeface="メイリオ" panose="020B0604030504040204" pitchFamily="50" charset="-128"/>
@@ -15741,7 +15605,7 @@
         <p:spPr>
           <a:xfrm>
             <a:off x="5968604" y="4634524"/>
-            <a:ext cx="1988045" cy="307777"/>
+            <a:ext cx="2385781" cy="307777"/>
           </a:xfrm>
           <a:prstGeom prst="rect">
             <a:avLst/>
@@ -15763,14 +15627,14 @@
               <a:t>コードの除去</a:t>
             </a:r>
             <a:r>
-              <a:rPr lang="en-US" altLang="ja-JP" sz="900" b="1" smtClean="0">
+              <a:rPr lang="en-US" altLang="ja-JP" sz="1400" b="1" smtClean="0">
                 <a:latin typeface="メイリオ" panose="020B0604030504040204" pitchFamily="50" charset="-128"/>
                 <a:ea typeface="メイリオ" panose="020B0604030504040204" pitchFamily="50" charset="-128"/>
                 <a:cs typeface="メイリオ" panose="020B0604030504040204" pitchFamily="50" charset="-128"/>
               </a:rPr>
               <a:t>(Removing)</a:t>
             </a:r>
-            <a:endParaRPr lang="en-US" sz="900" b="1" dirty="0">
+            <a:endParaRPr lang="en-US" sz="1400" b="1" dirty="0">
               <a:latin typeface="メイリオ" panose="020B0604030504040204" pitchFamily="50" charset="-128"/>
               <a:ea typeface="メイリオ" panose="020B0604030504040204" pitchFamily="50" charset="-128"/>
               <a:cs typeface="メイリオ" panose="020B0604030504040204" pitchFamily="50" charset="-128"/>
@@ -29808,7 +29672,7 @@
                 <a14:useLocalDpi xmlns:a14="http://schemas.microsoft.com/office/drawing/2010/main" val="0"/>
               </a:ext>
               <a:ext uri="{96DAC541-7B7A-43D3-8B79-37D633B846F1}">
-                <asvg:svgBlip xmlns="" xmlns:asvg="http://schemas.microsoft.com/office/drawing/2016/SVG/main" r:embed="rId25"/>
+                <asvg:svgBlip xmlns:asvg="http://schemas.microsoft.com/office/drawing/2016/SVG/main" xmlns="" r:embed="rId25"/>
               </a:ext>
             </a:extLst>
           </a:blip>
@@ -30289,7 +30153,7 @@
   <a:extraClrSchemeLst/>
   <a:extLst>
     <a:ext uri="{05A4C25C-085E-4340-85A3-A5531E510DB2}">
-      <thm15:themeFamily xmlns="" xmlns:thm15="http://schemas.microsoft.com/office/thememl/2012/main" name="Office Theme" id="{62F939B6-93AF-4DB8-9C6B-D6C7DFDC589F}" vid="{4A3C46E8-61CC-4603-A589-7422A47A8E4A}"/>
+      <thm15:themeFamily xmlns:thm15="http://schemas.microsoft.com/office/thememl/2012/main" xmlns="" name="Office Theme" id="{62F939B6-93AF-4DB8-9C6B-D6C7DFDC589F}" vid="{4A3C46E8-61CC-4603-A589-7422A47A8E4A}"/>
     </a:ext>
   </a:extLst>
 </a:theme>
@@ -30550,7 +30414,7 @@
   <a:extraClrSchemeLst/>
   <a:extLst>
     <a:ext uri="{05A4C25C-085E-4340-85A3-A5531E510DB2}">
-      <thm15:themeFamily xmlns="" xmlns:thm15="http://schemas.microsoft.com/office/thememl/2012/main" name="Office Theme" id="{62F939B6-93AF-4DB8-9C6B-D6C7DFDC589F}" vid="{4A3C46E8-61CC-4603-A589-7422A47A8E4A}"/>
+      <thm15:themeFamily xmlns:thm15="http://schemas.microsoft.com/office/thememl/2012/main" xmlns="" name="Office Theme" id="{62F939B6-93AF-4DB8-9C6B-D6C7DFDC589F}" vid="{4A3C46E8-61CC-4603-A589-7422A47A8E4A}"/>
     </a:ext>
   </a:extLst>
 </a:theme>
@@ -30811,7 +30675,7 @@
   <a:extraClrSchemeLst/>
   <a:extLst>
     <a:ext uri="{05A4C25C-085E-4340-85A3-A5531E510DB2}">
-      <thm15:themeFamily xmlns="" xmlns:thm15="http://schemas.microsoft.com/office/thememl/2012/main" name="Office Theme" id="{62F939B6-93AF-4DB8-9C6B-D6C7DFDC589F}" vid="{4A3C46E8-61CC-4603-A589-7422A47A8E4A}"/>
+      <thm15:themeFamily xmlns:thm15="http://schemas.microsoft.com/office/thememl/2012/main" xmlns="" name="Office Theme" id="{62F939B6-93AF-4DB8-9C6B-D6C7DFDC589F}" vid="{4A3C46E8-61CC-4603-A589-7422A47A8E4A}"/>
     </a:ext>
   </a:extLst>
 </a:theme>

</xml_diff>